<commit_message>
Exported backendBasepath now created base on configured
Frontend-API Backend Host and Path plus the Backend-API Resource path. #158
</commit_message>
<xml_diff>
--- a/misc/images/Image-Sources.pptx
+++ b/misc/images/Image-Sources.pptx
@@ -8,6 +8,7 @@
     <p:sldId id="256" r:id="rId2"/>
     <p:sldId id="257" r:id="rId3"/>
     <p:sldId id="258" r:id="rId4"/>
+    <p:sldId id="259" r:id="rId5"/>
   </p:sldIdLst>
   <p:sldSz cx="12192000" cy="6858000"/>
   <p:notesSz cx="6858000" cy="9144000"/>
@@ -263,7 +264,7 @@
           <a:p>
             <a:fld id="{0468A6AD-AB48-4D9A-B929-DFDF50B1C375}" type="datetimeFigureOut">
               <a:rPr lang="en-US" smtClean="0"/>
-              <a:t>6/25/2020</a:t>
+              <a:t>3/12/2021</a:t>
             </a:fld>
             <a:endParaRPr lang="en-US"/>
           </a:p>
@@ -463,7 +464,7 @@
           <a:p>
             <a:fld id="{0468A6AD-AB48-4D9A-B929-DFDF50B1C375}" type="datetimeFigureOut">
               <a:rPr lang="en-US" smtClean="0"/>
-              <a:t>6/25/2020</a:t>
+              <a:t>3/12/2021</a:t>
             </a:fld>
             <a:endParaRPr lang="en-US"/>
           </a:p>
@@ -673,7 +674,7 @@
           <a:p>
             <a:fld id="{0468A6AD-AB48-4D9A-B929-DFDF50B1C375}" type="datetimeFigureOut">
               <a:rPr lang="en-US" smtClean="0"/>
-              <a:t>6/25/2020</a:t>
+              <a:t>3/12/2021</a:t>
             </a:fld>
             <a:endParaRPr lang="en-US"/>
           </a:p>
@@ -873,7 +874,7 @@
           <a:p>
             <a:fld id="{0468A6AD-AB48-4D9A-B929-DFDF50B1C375}" type="datetimeFigureOut">
               <a:rPr lang="en-US" smtClean="0"/>
-              <a:t>6/25/2020</a:t>
+              <a:t>3/12/2021</a:t>
             </a:fld>
             <a:endParaRPr lang="en-US"/>
           </a:p>
@@ -1149,7 +1150,7 @@
           <a:p>
             <a:fld id="{0468A6AD-AB48-4D9A-B929-DFDF50B1C375}" type="datetimeFigureOut">
               <a:rPr lang="en-US" smtClean="0"/>
-              <a:t>6/25/2020</a:t>
+              <a:t>3/12/2021</a:t>
             </a:fld>
             <a:endParaRPr lang="en-US"/>
           </a:p>
@@ -1417,7 +1418,7 @@
           <a:p>
             <a:fld id="{0468A6AD-AB48-4D9A-B929-DFDF50B1C375}" type="datetimeFigureOut">
               <a:rPr lang="en-US" smtClean="0"/>
-              <a:t>6/25/2020</a:t>
+              <a:t>3/12/2021</a:t>
             </a:fld>
             <a:endParaRPr lang="en-US"/>
           </a:p>
@@ -1832,7 +1833,7 @@
           <a:p>
             <a:fld id="{0468A6AD-AB48-4D9A-B929-DFDF50B1C375}" type="datetimeFigureOut">
               <a:rPr lang="en-US" smtClean="0"/>
-              <a:t>6/25/2020</a:t>
+              <a:t>3/12/2021</a:t>
             </a:fld>
             <a:endParaRPr lang="en-US"/>
           </a:p>
@@ -1974,7 +1975,7 @@
           <a:p>
             <a:fld id="{0468A6AD-AB48-4D9A-B929-DFDF50B1C375}" type="datetimeFigureOut">
               <a:rPr lang="en-US" smtClean="0"/>
-              <a:t>6/25/2020</a:t>
+              <a:t>3/12/2021</a:t>
             </a:fld>
             <a:endParaRPr lang="en-US"/>
           </a:p>
@@ -2087,7 +2088,7 @@
           <a:p>
             <a:fld id="{0468A6AD-AB48-4D9A-B929-DFDF50B1C375}" type="datetimeFigureOut">
               <a:rPr lang="en-US" smtClean="0"/>
-              <a:t>6/25/2020</a:t>
+              <a:t>3/12/2021</a:t>
             </a:fld>
             <a:endParaRPr lang="en-US"/>
           </a:p>
@@ -2400,7 +2401,7 @@
           <a:p>
             <a:fld id="{0468A6AD-AB48-4D9A-B929-DFDF50B1C375}" type="datetimeFigureOut">
               <a:rPr lang="en-US" smtClean="0"/>
-              <a:t>6/25/2020</a:t>
+              <a:t>3/12/2021</a:t>
             </a:fld>
             <a:endParaRPr lang="en-US"/>
           </a:p>
@@ -2689,7 +2690,7 @@
           <a:p>
             <a:fld id="{0468A6AD-AB48-4D9A-B929-DFDF50B1C375}" type="datetimeFigureOut">
               <a:rPr lang="en-US" smtClean="0"/>
-              <a:t>6/25/2020</a:t>
+              <a:t>3/12/2021</a:t>
             </a:fld>
             <a:endParaRPr lang="en-US"/>
           </a:p>
@@ -2932,7 +2933,7 @@
           <a:p>
             <a:fld id="{0468A6AD-AB48-4D9A-B929-DFDF50B1C375}" type="datetimeFigureOut">
               <a:rPr lang="en-US" smtClean="0"/>
-              <a:t>6/25/2020</a:t>
+              <a:t>3/12/2021</a:t>
             </a:fld>
             <a:endParaRPr lang="en-US"/>
           </a:p>
@@ -3905,6 +3906,549 @@
 </p:sld>
 </file>
 
+<file path=ppt/slides/slide4.xml><?xml version="1.0" encoding="utf-8"?>
+<p:sld xmlns:a="http://schemas.openxmlformats.org/drawingml/2006/main" xmlns:r="http://schemas.openxmlformats.org/officeDocument/2006/relationships" xmlns:p="http://schemas.openxmlformats.org/presentationml/2006/main">
+  <p:cSld>
+    <p:spTree>
+      <p:nvGrpSpPr>
+        <p:cNvPr id="1" name=""/>
+        <p:cNvGrpSpPr/>
+        <p:nvPr/>
+      </p:nvGrpSpPr>
+      <p:grpSpPr>
+        <a:xfrm>
+          <a:off x="0" y="0"/>
+          <a:ext cx="0" cy="0"/>
+          <a:chOff x="0" y="0"/>
+          <a:chExt cx="0" cy="0"/>
+        </a:xfrm>
+      </p:grpSpPr>
+      <p:pic>
+        <p:nvPicPr>
+          <p:cNvPr id="9" name="Grafik 8">
+            <a:extLst>
+              <a:ext uri="{FF2B5EF4-FFF2-40B4-BE49-F238E27FC236}">
+                <a16:creationId xmlns:a16="http://schemas.microsoft.com/office/drawing/2014/main" id="{6A8483AA-3AE2-43CC-BF22-0B8CE8FBF35A}"/>
+              </a:ext>
+            </a:extLst>
+          </p:cNvPr>
+          <p:cNvPicPr>
+            <a:picLocks noChangeAspect="1"/>
+          </p:cNvPicPr>
+          <p:nvPr/>
+        </p:nvPicPr>
+        <p:blipFill>
+          <a:blip r:embed="rId2"/>
+          <a:stretch>
+            <a:fillRect/>
+          </a:stretch>
+        </p:blipFill>
+        <p:spPr>
+          <a:xfrm>
+            <a:off x="595354" y="953262"/>
+            <a:ext cx="3306086" cy="1844597"/>
+          </a:xfrm>
+          <a:prstGeom prst="rect">
+            <a:avLst/>
+          </a:prstGeom>
+        </p:spPr>
+      </p:pic>
+      <p:sp>
+        <p:nvSpPr>
+          <p:cNvPr id="11" name="Textfeld 10">
+            <a:extLst>
+              <a:ext uri="{FF2B5EF4-FFF2-40B4-BE49-F238E27FC236}">
+                <a16:creationId xmlns:a16="http://schemas.microsoft.com/office/drawing/2014/main" id="{51F91207-9681-4395-BDEE-49C9F1052FFE}"/>
+              </a:ext>
+            </a:extLst>
+          </p:cNvPr>
+          <p:cNvSpPr txBox="1"/>
+          <p:nvPr/>
+        </p:nvSpPr>
+        <p:spPr>
+          <a:xfrm>
+            <a:off x="777428" y="358140"/>
+            <a:ext cx="2895412" cy="400110"/>
+          </a:xfrm>
+          <a:prstGeom prst="rect">
+            <a:avLst/>
+          </a:prstGeom>
+          <a:noFill/>
+        </p:spPr>
+        <p:txBody>
+          <a:bodyPr wrap="square" rtlCol="0">
+            <a:spAutoFit/>
+          </a:bodyPr>
+          <a:lstStyle/>
+          <a:p>
+            <a:pPr algn="ctr"/>
+            <a:r>
+              <a:rPr lang="de-DE" sz="2000" dirty="0"/>
+              <a:t>Backend API</a:t>
+            </a:r>
+            <a:endParaRPr lang="en-US" sz="2000" dirty="0"/>
+          </a:p>
+        </p:txBody>
+      </p:sp>
+      <p:sp>
+        <p:nvSpPr>
+          <p:cNvPr id="12" name="Textfeld 11">
+            <a:extLst>
+              <a:ext uri="{FF2B5EF4-FFF2-40B4-BE49-F238E27FC236}">
+                <a16:creationId xmlns:a16="http://schemas.microsoft.com/office/drawing/2014/main" id="{236643C9-C711-4C3E-AA69-41C5ED23913D}"/>
+              </a:ext>
+            </a:extLst>
+          </p:cNvPr>
+          <p:cNvSpPr txBox="1"/>
+          <p:nvPr/>
+        </p:nvSpPr>
+        <p:spPr>
+          <a:xfrm>
+            <a:off x="4290248" y="358140"/>
+            <a:ext cx="2895412" cy="400110"/>
+          </a:xfrm>
+          <a:prstGeom prst="rect">
+            <a:avLst/>
+          </a:prstGeom>
+          <a:noFill/>
+        </p:spPr>
+        <p:txBody>
+          <a:bodyPr wrap="square" rtlCol="0">
+            <a:spAutoFit/>
+          </a:bodyPr>
+          <a:lstStyle/>
+          <a:p>
+            <a:pPr algn="ctr"/>
+            <a:r>
+              <a:rPr lang="de-DE" sz="2000" dirty="0"/>
+              <a:t>Frontend API Inbound</a:t>
+            </a:r>
+            <a:endParaRPr lang="en-US" sz="2000" dirty="0"/>
+          </a:p>
+        </p:txBody>
+      </p:sp>
+      <p:pic>
+        <p:nvPicPr>
+          <p:cNvPr id="14" name="Grafik 13">
+            <a:extLst>
+              <a:ext uri="{FF2B5EF4-FFF2-40B4-BE49-F238E27FC236}">
+                <a16:creationId xmlns:a16="http://schemas.microsoft.com/office/drawing/2014/main" id="{525AE073-8247-4626-9725-33ED973E4E2B}"/>
+              </a:ext>
+            </a:extLst>
+          </p:cNvPr>
+          <p:cNvPicPr>
+            <a:picLocks noChangeAspect="1"/>
+          </p:cNvPicPr>
+          <p:nvPr/>
+        </p:nvPicPr>
+        <p:blipFill>
+          <a:blip r:embed="rId3"/>
+          <a:stretch>
+            <a:fillRect/>
+          </a:stretch>
+        </p:blipFill>
+        <p:spPr>
+          <a:xfrm>
+            <a:off x="4239634" y="1378259"/>
+            <a:ext cx="3497391" cy="872853"/>
+          </a:xfrm>
+          <a:prstGeom prst="rect">
+            <a:avLst/>
+          </a:prstGeom>
+        </p:spPr>
+      </p:pic>
+      <p:sp>
+        <p:nvSpPr>
+          <p:cNvPr id="15" name="Textfeld 14">
+            <a:extLst>
+              <a:ext uri="{FF2B5EF4-FFF2-40B4-BE49-F238E27FC236}">
+                <a16:creationId xmlns:a16="http://schemas.microsoft.com/office/drawing/2014/main" id="{937B4997-5CAE-4328-938B-9F78F9B26BB2}"/>
+              </a:ext>
+            </a:extLst>
+          </p:cNvPr>
+          <p:cNvSpPr txBox="1"/>
+          <p:nvPr/>
+        </p:nvSpPr>
+        <p:spPr>
+          <a:xfrm>
+            <a:off x="8519160" y="358140"/>
+            <a:ext cx="2895412" cy="400110"/>
+          </a:xfrm>
+          <a:prstGeom prst="rect">
+            <a:avLst/>
+          </a:prstGeom>
+          <a:noFill/>
+        </p:spPr>
+        <p:txBody>
+          <a:bodyPr wrap="square" rtlCol="0">
+            <a:spAutoFit/>
+          </a:bodyPr>
+          <a:lstStyle/>
+          <a:p>
+            <a:pPr algn="ctr"/>
+            <a:r>
+              <a:rPr lang="de-DE" sz="2000" dirty="0"/>
+              <a:t>Frontend API Outbound</a:t>
+            </a:r>
+            <a:endParaRPr lang="en-US" sz="2000" dirty="0"/>
+          </a:p>
+        </p:txBody>
+      </p:sp>
+      <p:pic>
+        <p:nvPicPr>
+          <p:cNvPr id="17" name="Grafik 16">
+            <a:extLst>
+              <a:ext uri="{FF2B5EF4-FFF2-40B4-BE49-F238E27FC236}">
+                <a16:creationId xmlns:a16="http://schemas.microsoft.com/office/drawing/2014/main" id="{832CDF04-C839-4128-AB31-07B27FD0F31E}"/>
+              </a:ext>
+            </a:extLst>
+          </p:cNvPr>
+          <p:cNvPicPr>
+            <a:picLocks noChangeAspect="1"/>
+          </p:cNvPicPr>
+          <p:nvPr/>
+        </p:nvPicPr>
+        <p:blipFill>
+          <a:blip r:embed="rId4"/>
+          <a:stretch>
+            <a:fillRect/>
+          </a:stretch>
+        </p:blipFill>
+        <p:spPr>
+          <a:xfrm>
+            <a:off x="7848602" y="902759"/>
+            <a:ext cx="4084412" cy="1581063"/>
+          </a:xfrm>
+          <a:prstGeom prst="rect">
+            <a:avLst/>
+          </a:prstGeom>
+        </p:spPr>
+      </p:pic>
+      <p:sp>
+        <p:nvSpPr>
+          <p:cNvPr id="18" name="Pfeil: nach unten 17">
+            <a:extLst>
+              <a:ext uri="{FF2B5EF4-FFF2-40B4-BE49-F238E27FC236}">
+                <a16:creationId xmlns:a16="http://schemas.microsoft.com/office/drawing/2014/main" id="{A7773CD8-3053-47FB-BC9F-7F1464024C3C}"/>
+              </a:ext>
+            </a:extLst>
+          </p:cNvPr>
+          <p:cNvSpPr/>
+          <p:nvPr/>
+        </p:nvSpPr>
+        <p:spPr>
+          <a:xfrm>
+            <a:off x="4640580" y="2958683"/>
+            <a:ext cx="2369820" cy="872853"/>
+          </a:xfrm>
+          <a:prstGeom prst="downArrow">
+            <a:avLst/>
+          </a:prstGeom>
+          <a:solidFill>
+            <a:srgbClr val="C00000"/>
+          </a:solidFill>
+          <a:ln>
+            <a:solidFill>
+              <a:srgbClr val="FF0000"/>
+            </a:solidFill>
+          </a:ln>
+        </p:spPr>
+        <p:style>
+          <a:lnRef idx="2">
+            <a:schemeClr val="accent1">
+              <a:shade val="50000"/>
+            </a:schemeClr>
+          </a:lnRef>
+          <a:fillRef idx="1">
+            <a:schemeClr val="accent1"/>
+          </a:fillRef>
+          <a:effectRef idx="0">
+            <a:schemeClr val="accent1"/>
+          </a:effectRef>
+          <a:fontRef idx="minor">
+            <a:schemeClr val="lt1"/>
+          </a:fontRef>
+        </p:style>
+        <p:txBody>
+          <a:bodyPr rtlCol="0" anchor="ctr"/>
+          <a:lstStyle/>
+          <a:p>
+            <a:pPr algn="ctr"/>
+            <a:r>
+              <a:rPr lang="de-DE" sz="2400" dirty="0"/>
+              <a:t>Export</a:t>
+            </a:r>
+            <a:endParaRPr lang="en-US" dirty="0"/>
+          </a:p>
+        </p:txBody>
+      </p:sp>
+      <p:sp>
+        <p:nvSpPr>
+          <p:cNvPr id="19" name="Textfeld 18">
+            <a:extLst>
+              <a:ext uri="{FF2B5EF4-FFF2-40B4-BE49-F238E27FC236}">
+                <a16:creationId xmlns:a16="http://schemas.microsoft.com/office/drawing/2014/main" id="{A63A35CD-34C1-48A5-8DA0-241FF9B8B35C}"/>
+              </a:ext>
+            </a:extLst>
+          </p:cNvPr>
+          <p:cNvSpPr txBox="1"/>
+          <p:nvPr/>
+        </p:nvSpPr>
+        <p:spPr>
+          <a:xfrm>
+            <a:off x="1638488" y="3945975"/>
+            <a:ext cx="2895412" cy="400110"/>
+          </a:xfrm>
+          <a:prstGeom prst="rect">
+            <a:avLst/>
+          </a:prstGeom>
+          <a:noFill/>
+        </p:spPr>
+        <p:txBody>
+          <a:bodyPr wrap="square" rtlCol="0">
+            <a:spAutoFit/>
+          </a:bodyPr>
+          <a:lstStyle/>
+          <a:p>
+            <a:pPr algn="ctr"/>
+            <a:r>
+              <a:rPr lang="de-DE" sz="2000" dirty="0"/>
+              <a:t>API-</a:t>
+            </a:r>
+            <a:r>
+              <a:rPr lang="de-DE" sz="2000" dirty="0" err="1"/>
+              <a:t>Config</a:t>
+            </a:r>
+            <a:r>
+              <a:rPr lang="de-DE" sz="2000" dirty="0"/>
+              <a:t> File</a:t>
+            </a:r>
+            <a:endParaRPr lang="en-US" sz="2000" dirty="0"/>
+          </a:p>
+        </p:txBody>
+      </p:sp>
+      <p:pic>
+        <p:nvPicPr>
+          <p:cNvPr id="24" name="Grafik 23">
+            <a:extLst>
+              <a:ext uri="{FF2B5EF4-FFF2-40B4-BE49-F238E27FC236}">
+                <a16:creationId xmlns:a16="http://schemas.microsoft.com/office/drawing/2014/main" id="{ACECFD42-56DA-42CE-8D03-A601B75BECBD}"/>
+              </a:ext>
+            </a:extLst>
+          </p:cNvPr>
+          <p:cNvPicPr>
+            <a:picLocks noChangeAspect="1"/>
+          </p:cNvPicPr>
+          <p:nvPr/>
+        </p:nvPicPr>
+        <p:blipFill>
+          <a:blip r:embed="rId5"/>
+          <a:stretch>
+            <a:fillRect/>
+          </a:stretch>
+        </p:blipFill>
+        <p:spPr>
+          <a:xfrm>
+            <a:off x="699258" y="4393864"/>
+            <a:ext cx="5396742" cy="1314061"/>
+          </a:xfrm>
+          <a:prstGeom prst="rect">
+            <a:avLst/>
+          </a:prstGeom>
+        </p:spPr>
+      </p:pic>
+      <p:sp>
+        <p:nvSpPr>
+          <p:cNvPr id="20" name="Rechteck 19">
+            <a:extLst>
+              <a:ext uri="{FF2B5EF4-FFF2-40B4-BE49-F238E27FC236}">
+                <a16:creationId xmlns:a16="http://schemas.microsoft.com/office/drawing/2014/main" id="{6BB29B5A-FBC1-4E2F-8AA2-D88FBC263F30}"/>
+              </a:ext>
+            </a:extLst>
+          </p:cNvPr>
+          <p:cNvSpPr/>
+          <p:nvPr/>
+        </p:nvSpPr>
+        <p:spPr>
+          <a:xfrm>
+            <a:off x="805938" y="5289106"/>
+            <a:ext cx="5229290" cy="184155"/>
+          </a:xfrm>
+          <a:prstGeom prst="rect">
+            <a:avLst/>
+          </a:prstGeom>
+          <a:solidFill>
+            <a:srgbClr val="FFFF00">
+              <a:alpha val="34118"/>
+            </a:srgbClr>
+          </a:solidFill>
+          <a:ln>
+            <a:noFill/>
+          </a:ln>
+        </p:spPr>
+        <p:style>
+          <a:lnRef idx="2">
+            <a:schemeClr val="accent1">
+              <a:shade val="50000"/>
+            </a:schemeClr>
+          </a:lnRef>
+          <a:fillRef idx="1">
+            <a:schemeClr val="accent1"/>
+          </a:fillRef>
+          <a:effectRef idx="0">
+            <a:schemeClr val="accent1"/>
+          </a:effectRef>
+          <a:fontRef idx="minor">
+            <a:schemeClr val="lt1"/>
+          </a:fontRef>
+        </p:style>
+        <p:txBody>
+          <a:bodyPr rtlCol="0" anchor="ctr"/>
+          <a:lstStyle/>
+          <a:p>
+            <a:pPr algn="ctr"/>
+            <a:endParaRPr lang="en-US"/>
+          </a:p>
+        </p:txBody>
+      </p:sp>
+      <p:pic>
+        <p:nvPicPr>
+          <p:cNvPr id="26" name="Grafik 25">
+            <a:extLst>
+              <a:ext uri="{FF2B5EF4-FFF2-40B4-BE49-F238E27FC236}">
+                <a16:creationId xmlns:a16="http://schemas.microsoft.com/office/drawing/2014/main" id="{7693BAAE-D04E-4F3F-AFCA-1D2CB0B4665A}"/>
+              </a:ext>
+            </a:extLst>
+          </p:cNvPr>
+          <p:cNvPicPr>
+            <a:picLocks noChangeAspect="1"/>
+          </p:cNvPicPr>
+          <p:nvPr/>
+        </p:nvPicPr>
+        <p:blipFill>
+          <a:blip r:embed="rId6"/>
+          <a:stretch>
+            <a:fillRect/>
+          </a:stretch>
+        </p:blipFill>
+        <p:spPr>
+          <a:xfrm>
+            <a:off x="7945303" y="4374179"/>
+            <a:ext cx="2473690" cy="1829853"/>
+          </a:xfrm>
+          <a:prstGeom prst="rect">
+            <a:avLst/>
+          </a:prstGeom>
+        </p:spPr>
+      </p:pic>
+      <p:sp>
+        <p:nvSpPr>
+          <p:cNvPr id="27" name="Rechteck 26">
+            <a:extLst>
+              <a:ext uri="{FF2B5EF4-FFF2-40B4-BE49-F238E27FC236}">
+                <a16:creationId xmlns:a16="http://schemas.microsoft.com/office/drawing/2014/main" id="{E874AEB8-64C4-41CB-9756-F2BC20329F10}"/>
+              </a:ext>
+            </a:extLst>
+          </p:cNvPr>
+          <p:cNvSpPr/>
+          <p:nvPr/>
+        </p:nvSpPr>
+        <p:spPr>
+          <a:xfrm>
+            <a:off x="8069580" y="5296343"/>
+            <a:ext cx="2407732" cy="762909"/>
+          </a:xfrm>
+          <a:prstGeom prst="rect">
+            <a:avLst/>
+          </a:prstGeom>
+          <a:solidFill>
+            <a:srgbClr val="FFFF00">
+              <a:alpha val="34118"/>
+            </a:srgbClr>
+          </a:solidFill>
+          <a:ln>
+            <a:noFill/>
+          </a:ln>
+        </p:spPr>
+        <p:style>
+          <a:lnRef idx="2">
+            <a:schemeClr val="accent1">
+              <a:shade val="50000"/>
+            </a:schemeClr>
+          </a:lnRef>
+          <a:fillRef idx="1">
+            <a:schemeClr val="accent1"/>
+          </a:fillRef>
+          <a:effectRef idx="0">
+            <a:schemeClr val="accent1"/>
+          </a:effectRef>
+          <a:fontRef idx="minor">
+            <a:schemeClr val="lt1"/>
+          </a:fontRef>
+        </p:style>
+        <p:txBody>
+          <a:bodyPr rtlCol="0" anchor="ctr"/>
+          <a:lstStyle/>
+          <a:p>
+            <a:pPr algn="ctr"/>
+            <a:endParaRPr lang="en-US"/>
+          </a:p>
+        </p:txBody>
+      </p:sp>
+      <p:sp>
+        <p:nvSpPr>
+          <p:cNvPr id="28" name="Textfeld 27">
+            <a:extLst>
+              <a:ext uri="{FF2B5EF4-FFF2-40B4-BE49-F238E27FC236}">
+                <a16:creationId xmlns:a16="http://schemas.microsoft.com/office/drawing/2014/main" id="{440218F9-9351-4A66-9410-D8B33DBF7FB9}"/>
+              </a:ext>
+            </a:extLst>
+          </p:cNvPr>
+          <p:cNvSpPr txBox="1"/>
+          <p:nvPr/>
+        </p:nvSpPr>
+        <p:spPr>
+          <a:xfrm>
+            <a:off x="7734442" y="3945975"/>
+            <a:ext cx="2895412" cy="400110"/>
+          </a:xfrm>
+          <a:prstGeom prst="rect">
+            <a:avLst/>
+          </a:prstGeom>
+          <a:noFill/>
+        </p:spPr>
+        <p:txBody>
+          <a:bodyPr wrap="square" rtlCol="0">
+            <a:spAutoFit/>
+          </a:bodyPr>
+          <a:lstStyle/>
+          <a:p>
+            <a:pPr algn="ctr"/>
+            <a:r>
+              <a:rPr lang="de-DE" sz="2000" dirty="0"/>
+              <a:t>API-</a:t>
+            </a:r>
+            <a:r>
+              <a:rPr lang="de-DE" sz="2000" dirty="0" err="1"/>
+              <a:t>Specification</a:t>
+            </a:r>
+            <a:endParaRPr lang="en-US" sz="2000" dirty="0"/>
+          </a:p>
+        </p:txBody>
+      </p:sp>
+    </p:spTree>
+    <p:extLst>
+      <p:ext uri="{BB962C8B-B14F-4D97-AF65-F5344CB8AC3E}">
+        <p14:creationId xmlns:p14="http://schemas.microsoft.com/office/powerpoint/2010/main" val="2073568745"/>
+      </p:ext>
+    </p:extLst>
+  </p:cSld>
+  <p:clrMapOvr>
+    <a:masterClrMapping/>
+  </p:clrMapOvr>
+</p:sld>
+</file>
+
 <file path=ppt/theme/theme1.xml><?xml version="1.0" encoding="utf-8"?>
 <a:theme xmlns:a="http://schemas.openxmlformats.org/drawingml/2006/main" name="Office">
   <a:themeElements>

</xml_diff>